<commit_message>
update UG and DG and PPP
</commit_message>
<xml_diff>
--- a/docs/diagrams/UndoRedoSequenceDiagram.pptx
+++ b/docs/diagrams/UndoRedoSequenceDiagram.pptx
@@ -109,25 +109,10 @@
   </p:defaultTextStyle>
   <p:extLst>
     <p:ext uri="{EFAFB233-063F-42B5-8137-9DF3F51BA10A}">
-      <p15:sldGuideLst xmlns:p15="http://schemas.microsoft.com/office/powerpoint/2012/main">
-        <p15:guide id="1" orient="horz" pos="1488">
-          <p15:clr>
-            <a:srgbClr val="A4A3A4"/>
-          </p15:clr>
-        </p15:guide>
-        <p15:guide id="2" pos="2880">
-          <p15:clr>
-            <a:srgbClr val="A4A3A4"/>
-          </p15:clr>
-        </p15:guide>
-      </p15:sldGuideLst>
+      <p15:sldGuideLst xmlns:p15="http://schemas.microsoft.com/office/powerpoint/2012/main"/>
     </p:ext>
   </p:extLst>
 </p:presentation>
-</file>
-
-<file path=ppt/revisionInfo.xml><?xml version="1.0" encoding="utf-8"?>
-<p1510:revInfo xmlns:a="http://schemas.openxmlformats.org/drawingml/2006/main" xmlns:r="http://schemas.openxmlformats.org/officeDocument/2006/relationships" xmlns:p1510="http://schemas.microsoft.com/office/powerpoint/2015/10/main"/>
 </file>
 
 <file path=ppt/notesMasters/notesMaster1.xml><?xml version="1.0" encoding="utf-8"?>
@@ -212,7 +197,7 @@
           <a:p>
             <a:fld id="{F5CC4B3F-88C1-4FFA-B1B6-F41C21DC6924}" type="datetimeFigureOut">
               <a:rPr lang="en-US" smtClean="0"/>
-              <a:t>7/6/2018</a:t>
+              <a:t>4/2/19</a:t>
             </a:fld>
             <a:endParaRPr lang="en-US"/>
           </a:p>
@@ -658,7 +643,7 @@
           <a:p>
             <a:fld id="{78C97017-6FC3-485B-9764-EAC9E56C1D49}" type="datetimeFigureOut">
               <a:rPr lang="en-US" smtClean="0"/>
-              <a:t>7/6/2018</a:t>
+              <a:t>4/2/19</a:t>
             </a:fld>
             <a:endParaRPr lang="en-US"/>
           </a:p>
@@ -826,7 +811,7 @@
           <a:p>
             <a:fld id="{78C97017-6FC3-485B-9764-EAC9E56C1D49}" type="datetimeFigureOut">
               <a:rPr lang="en-US" smtClean="0"/>
-              <a:t>7/6/2018</a:t>
+              <a:t>4/2/19</a:t>
             </a:fld>
             <a:endParaRPr lang="en-US"/>
           </a:p>
@@ -1004,7 +989,7 @@
           <a:p>
             <a:fld id="{78C97017-6FC3-485B-9764-EAC9E56C1D49}" type="datetimeFigureOut">
               <a:rPr lang="en-US" smtClean="0"/>
-              <a:t>7/6/2018</a:t>
+              <a:t>4/2/19</a:t>
             </a:fld>
             <a:endParaRPr lang="en-US"/>
           </a:p>
@@ -1172,7 +1157,7 @@
           <a:p>
             <a:fld id="{78C97017-6FC3-485B-9764-EAC9E56C1D49}" type="datetimeFigureOut">
               <a:rPr lang="en-US" smtClean="0"/>
-              <a:t>7/6/2018</a:t>
+              <a:t>4/2/19</a:t>
             </a:fld>
             <a:endParaRPr lang="en-US"/>
           </a:p>
@@ -1417,7 +1402,7 @@
           <a:p>
             <a:fld id="{78C97017-6FC3-485B-9764-EAC9E56C1D49}" type="datetimeFigureOut">
               <a:rPr lang="en-US" smtClean="0"/>
-              <a:t>7/6/2018</a:t>
+              <a:t>4/2/19</a:t>
             </a:fld>
             <a:endParaRPr lang="en-US"/>
           </a:p>
@@ -1702,7 +1687,7 @@
           <a:p>
             <a:fld id="{78C97017-6FC3-485B-9764-EAC9E56C1D49}" type="datetimeFigureOut">
               <a:rPr lang="en-US" smtClean="0"/>
-              <a:t>7/6/2018</a:t>
+              <a:t>4/2/19</a:t>
             </a:fld>
             <a:endParaRPr lang="en-US"/>
           </a:p>
@@ -2121,7 +2106,7 @@
           <a:p>
             <a:fld id="{78C97017-6FC3-485B-9764-EAC9E56C1D49}" type="datetimeFigureOut">
               <a:rPr lang="en-US" smtClean="0"/>
-              <a:t>7/6/2018</a:t>
+              <a:t>4/2/19</a:t>
             </a:fld>
             <a:endParaRPr lang="en-US"/>
           </a:p>
@@ -2238,7 +2223,7 @@
           <a:p>
             <a:fld id="{78C97017-6FC3-485B-9764-EAC9E56C1D49}" type="datetimeFigureOut">
               <a:rPr lang="en-US" smtClean="0"/>
-              <a:t>7/6/2018</a:t>
+              <a:t>4/2/19</a:t>
             </a:fld>
             <a:endParaRPr lang="en-US"/>
           </a:p>
@@ -2333,7 +2318,7 @@
           <a:p>
             <a:fld id="{78C97017-6FC3-485B-9764-EAC9E56C1D49}" type="datetimeFigureOut">
               <a:rPr lang="en-US" smtClean="0"/>
-              <a:t>7/6/2018</a:t>
+              <a:t>4/2/19</a:t>
             </a:fld>
             <a:endParaRPr lang="en-US"/>
           </a:p>
@@ -2608,7 +2593,7 @@
           <a:p>
             <a:fld id="{78C97017-6FC3-485B-9764-EAC9E56C1D49}" type="datetimeFigureOut">
               <a:rPr lang="en-US" smtClean="0"/>
-              <a:t>7/6/2018</a:t>
+              <a:t>4/2/19</a:t>
             </a:fld>
             <a:endParaRPr lang="en-US"/>
           </a:p>
@@ -2860,7 +2845,7 @@
           <a:p>
             <a:fld id="{78C97017-6FC3-485B-9764-EAC9E56C1D49}" type="datetimeFigureOut">
               <a:rPr lang="en-US" smtClean="0"/>
-              <a:t>7/6/2018</a:t>
+              <a:t>4/2/19</a:t>
             </a:fld>
             <a:endParaRPr lang="en-US"/>
           </a:p>
@@ -3071,7 +3056,7 @@
           <a:p>
             <a:fld id="{78C97017-6FC3-485B-9764-EAC9E56C1D49}" type="datetimeFigureOut">
               <a:rPr lang="en-US" smtClean="0"/>
-              <a:t>7/6/2018</a:t>
+              <a:t>4/2/19</a:t>
             </a:fld>
             <a:endParaRPr lang="en-US"/>
           </a:p>

</xml_diff>

<commit_message>
edit ppp, ug, dg
</commit_message>
<xml_diff>
--- a/docs/diagrams/UndoRedoSequenceDiagram.pptx
+++ b/docs/diagrams/UndoRedoSequenceDiagram.pptx
@@ -109,7 +109,7 @@
   </p:defaultTextStyle>
   <p:extLst>
     <p:ext uri="{EFAFB233-063F-42B5-8137-9DF3F51BA10A}">
-      <p15:sldGuideLst xmlns:p15="http://schemas.microsoft.com/office/powerpoint/2012/main" xmlns="">
+      <p15:sldGuideLst xmlns="" xmlns:p15="http://schemas.microsoft.com/office/powerpoint/2012/main">
         <p15:guide id="1" orient="horz" pos="1488">
           <p15:clr>
             <a:srgbClr val="A4A3A4"/>
@@ -212,7 +212,7 @@
           <a:p>
             <a:fld id="{F5CC4B3F-88C1-4FFA-B1B6-F41C21DC6924}" type="datetimeFigureOut">
               <a:rPr lang="en-US" smtClean="0"/>
-              <a:t>4/1/2019</a:t>
+              <a:t>4/3/2019</a:t>
             </a:fld>
             <a:endParaRPr lang="en-US"/>
           </a:p>
@@ -658,7 +658,7 @@
           <a:p>
             <a:fld id="{78C97017-6FC3-485B-9764-EAC9E56C1D49}" type="datetimeFigureOut">
               <a:rPr lang="en-US" smtClean="0"/>
-              <a:t>4/1/2019</a:t>
+              <a:t>4/3/2019</a:t>
             </a:fld>
             <a:endParaRPr lang="en-US"/>
           </a:p>
@@ -826,7 +826,7 @@
           <a:p>
             <a:fld id="{78C97017-6FC3-485B-9764-EAC9E56C1D49}" type="datetimeFigureOut">
               <a:rPr lang="en-US" smtClean="0"/>
-              <a:t>4/1/2019</a:t>
+              <a:t>4/3/2019</a:t>
             </a:fld>
             <a:endParaRPr lang="en-US"/>
           </a:p>
@@ -1004,7 +1004,7 @@
           <a:p>
             <a:fld id="{78C97017-6FC3-485B-9764-EAC9E56C1D49}" type="datetimeFigureOut">
               <a:rPr lang="en-US" smtClean="0"/>
-              <a:t>4/1/2019</a:t>
+              <a:t>4/3/2019</a:t>
             </a:fld>
             <a:endParaRPr lang="en-US"/>
           </a:p>
@@ -1172,7 +1172,7 @@
           <a:p>
             <a:fld id="{78C97017-6FC3-485B-9764-EAC9E56C1D49}" type="datetimeFigureOut">
               <a:rPr lang="en-US" smtClean="0"/>
-              <a:t>4/1/2019</a:t>
+              <a:t>4/3/2019</a:t>
             </a:fld>
             <a:endParaRPr lang="en-US"/>
           </a:p>
@@ -1417,7 +1417,7 @@
           <a:p>
             <a:fld id="{78C97017-6FC3-485B-9764-EAC9E56C1D49}" type="datetimeFigureOut">
               <a:rPr lang="en-US" smtClean="0"/>
-              <a:t>4/1/2019</a:t>
+              <a:t>4/3/2019</a:t>
             </a:fld>
             <a:endParaRPr lang="en-US"/>
           </a:p>
@@ -1702,7 +1702,7 @@
           <a:p>
             <a:fld id="{78C97017-6FC3-485B-9764-EAC9E56C1D49}" type="datetimeFigureOut">
               <a:rPr lang="en-US" smtClean="0"/>
-              <a:t>4/1/2019</a:t>
+              <a:t>4/3/2019</a:t>
             </a:fld>
             <a:endParaRPr lang="en-US"/>
           </a:p>
@@ -2121,7 +2121,7 @@
           <a:p>
             <a:fld id="{78C97017-6FC3-485B-9764-EAC9E56C1D49}" type="datetimeFigureOut">
               <a:rPr lang="en-US" smtClean="0"/>
-              <a:t>4/1/2019</a:t>
+              <a:t>4/3/2019</a:t>
             </a:fld>
             <a:endParaRPr lang="en-US"/>
           </a:p>
@@ -2238,7 +2238,7 @@
           <a:p>
             <a:fld id="{78C97017-6FC3-485B-9764-EAC9E56C1D49}" type="datetimeFigureOut">
               <a:rPr lang="en-US" smtClean="0"/>
-              <a:t>4/1/2019</a:t>
+              <a:t>4/3/2019</a:t>
             </a:fld>
             <a:endParaRPr lang="en-US"/>
           </a:p>
@@ -2333,7 +2333,7 @@
           <a:p>
             <a:fld id="{78C97017-6FC3-485B-9764-EAC9E56C1D49}" type="datetimeFigureOut">
               <a:rPr lang="en-US" smtClean="0"/>
-              <a:t>4/1/2019</a:t>
+              <a:t>4/3/2019</a:t>
             </a:fld>
             <a:endParaRPr lang="en-US"/>
           </a:p>
@@ -2608,7 +2608,7 @@
           <a:p>
             <a:fld id="{78C97017-6FC3-485B-9764-EAC9E56C1D49}" type="datetimeFigureOut">
               <a:rPr lang="en-US" smtClean="0"/>
-              <a:t>4/1/2019</a:t>
+              <a:t>4/3/2019</a:t>
             </a:fld>
             <a:endParaRPr lang="en-US"/>
           </a:p>
@@ -2860,7 +2860,7 @@
           <a:p>
             <a:fld id="{78C97017-6FC3-485B-9764-EAC9E56C1D49}" type="datetimeFigureOut">
               <a:rPr lang="en-US" smtClean="0"/>
-              <a:t>4/1/2019</a:t>
+              <a:t>4/3/2019</a:t>
             </a:fld>
             <a:endParaRPr lang="en-US"/>
           </a:p>
@@ -3071,7 +3071,7 @@
           <a:p>
             <a:fld id="{78C97017-6FC3-485B-9764-EAC9E56C1D49}" type="datetimeFigureOut">
               <a:rPr lang="en-US" smtClean="0"/>
-              <a:t>4/1/2019</a:t>
+              <a:t>4/3/2019</a:t>
             </a:fld>
             <a:endParaRPr lang="en-US"/>
           </a:p>
@@ -3617,15 +3617,7 @@
                   <a:schemeClr val="bg1"/>
                 </a:solidFill>
               </a:rPr>
-              <a:t>:</a:t>
-            </a:r>
-            <a:r>
-              <a:rPr lang="en-US" sz="1600" dirty="0" err="1">
-                <a:solidFill>
-                  <a:schemeClr val="bg1"/>
-                </a:solidFill>
-              </a:rPr>
-              <a:t>LogicManager</a:t>
+              <a:t>:LogicManager</a:t>
             </a:r>
             <a:endParaRPr lang="en-SG" sz="1600" dirty="0">
               <a:solidFill>
@@ -3770,23 +3762,7 @@
                   <a:schemeClr val="bg1"/>
                 </a:solidFill>
               </a:rPr>
-              <a:t>:</a:t>
-            </a:r>
-            <a:r>
-              <a:rPr lang="en-US" sz="1600" dirty="0" err="1" smtClean="0">
-                <a:solidFill>
-                  <a:schemeClr val="bg1"/>
-                </a:solidFill>
-              </a:rPr>
-              <a:t>TopDeck</a:t>
-            </a:r>
-            <a:r>
-              <a:rPr lang="en-US" sz="1600" dirty="0" err="1" smtClean="0">
-                <a:solidFill>
-                  <a:schemeClr val="bg1"/>
-                </a:solidFill>
-              </a:rPr>
-              <a:t>Parser</a:t>
+              <a:t>:TopDeckParser</a:t>
             </a:r>
             <a:endParaRPr lang="en-SG" sz="1600" dirty="0">
               <a:solidFill>
@@ -4317,7 +4293,7 @@
           </a:lstStyle>
           <a:p>
             <a:r>
-              <a:rPr lang="en-US" sz="1200" dirty="0" err="1" smtClean="0">
+              <a:rPr lang="en-US" sz="1200" dirty="0" smtClean="0">
                 <a:solidFill>
                   <a:schemeClr val="accent4">
                     <a:lumMod val="75000"/>
@@ -4327,20 +4303,12 @@
               <a:t>undo</a:t>
             </a:r>
             <a:r>
-              <a:rPr lang="en-US" sz="1200" dirty="0" err="1" smtClean="0">
-                <a:solidFill>
-                  <a:srgbClr val="7030A0"/>
-                </a:solidFill>
-              </a:rPr>
-              <a:t>TopDeck</a:t>
-            </a:r>
-            <a:r>
               <a:rPr lang="en-US" sz="1200" dirty="0" smtClean="0">
                 <a:solidFill>
                   <a:srgbClr val="7030A0"/>
                 </a:solidFill>
               </a:rPr>
-              <a:t>()</a:t>
+              <a:t>TopDeck()</a:t>
             </a:r>
             <a:endParaRPr lang="en-US" sz="1200" dirty="0"/>
           </a:p>
@@ -4380,12 +4348,8 @@
           </a:lstStyle>
           <a:p>
             <a:r>
-              <a:rPr lang="en-US" dirty="0" err="1"/>
-              <a:t>parseCommand</a:t>
-            </a:r>
-            <a:r>
               <a:rPr lang="en-US" dirty="0"/>
-              <a:t>(“undo”)</a:t>
+              <a:t>parseCommand(“undo”)</a:t>
             </a:r>
           </a:p>
         </p:txBody>
@@ -4522,7 +4486,7 @@
               <a:t>:</a:t>
             </a:r>
             <a:r>
-              <a:rPr lang="en-US" sz="1600" dirty="0" err="1" smtClean="0">
+              <a:rPr lang="en-US" sz="1600" dirty="0" smtClean="0">
                 <a:solidFill>
                   <a:schemeClr val="bg1"/>
                 </a:solidFill>
@@ -4919,7 +4883,7 @@
           <p:cNvPr id="66" name="Straight Arrow Connector 65">
             <a:extLst>
               <a:ext uri="{FF2B5EF4-FFF2-40B4-BE49-F238E27FC236}">
-                <a16:creationId xmlns:a16="http://schemas.microsoft.com/office/drawing/2014/main" xmlns="" id="{39916E2E-195A-4DC8-B025-B05FA87E6796}"/>
+                <a16:creationId xmlns="" xmlns:a16="http://schemas.microsoft.com/office/drawing/2014/main" id="{39916E2E-195A-4DC8-B025-B05FA87E6796}"/>
               </a:ext>
             </a:extLst>
           </p:cNvPr>
@@ -4963,7 +4927,7 @@
           <p:cNvPr id="67" name="Straight Arrow Connector 66">
             <a:extLst>
               <a:ext uri="{FF2B5EF4-FFF2-40B4-BE49-F238E27FC236}">
-                <a16:creationId xmlns:a16="http://schemas.microsoft.com/office/drawing/2014/main" xmlns="" id="{D881596E-177C-4FDC-8E60-CAB90B3D5FAB}"/>
+                <a16:creationId xmlns="" xmlns:a16="http://schemas.microsoft.com/office/drawing/2014/main" id="{D881596E-177C-4FDC-8E60-CAB90B3D5FAB}"/>
               </a:ext>
             </a:extLst>
           </p:cNvPr>
@@ -5007,7 +4971,7 @@
           <p:cNvPr id="69" name="Straight Arrow Connector 68">
             <a:extLst>
               <a:ext uri="{FF2B5EF4-FFF2-40B4-BE49-F238E27FC236}">
-                <a16:creationId xmlns:a16="http://schemas.microsoft.com/office/drawing/2014/main" xmlns="" id="{7C9F21BC-13A9-471F-825A-2621FD36355F}"/>
+                <a16:creationId xmlns="" xmlns:a16="http://schemas.microsoft.com/office/drawing/2014/main" id="{7C9F21BC-13A9-471F-825A-2621FD36355F}"/>
               </a:ext>
             </a:extLst>
           </p:cNvPr>
@@ -5053,7 +5017,7 @@
           <p:cNvPr id="88" name="TextBox 87">
             <a:extLst>
               <a:ext uri="{FF2B5EF4-FFF2-40B4-BE49-F238E27FC236}">
-                <a16:creationId xmlns:a16="http://schemas.microsoft.com/office/drawing/2014/main" xmlns="" id="{B85C6184-7378-4E89-A338-72B1E5056F4F}"/>
+                <a16:creationId xmlns="" xmlns:a16="http://schemas.microsoft.com/office/drawing/2014/main" id="{B85C6184-7378-4E89-A338-72B1E5056F4F}"/>
               </a:ext>
             </a:extLst>
           </p:cNvPr>
@@ -5062,8 +5026,8 @@
         </p:nvSpPr>
         <p:spPr>
           <a:xfrm>
-            <a:off x="8769530" y="3267337"/>
-            <a:ext cx="2120786" cy="184666"/>
+            <a:off x="7972803" y="3235847"/>
+            <a:ext cx="2120786" cy="369332"/>
           </a:xfrm>
           <a:prstGeom prst="rect">
             <a:avLst/>
@@ -5088,28 +5052,22 @@
           </a:lstStyle>
           <a:p>
             <a:r>
-              <a:rPr lang="en-US" sz="1200" dirty="0" err="1" smtClean="0">
-                <a:solidFill>
-                  <a:srgbClr val="7030A0"/>
-                </a:solidFill>
-              </a:rPr>
-              <a:t>resetData</a:t>
-            </a:r>
-            <a:r>
               <a:rPr lang="en-US" sz="1200" dirty="0" smtClean="0">
                 <a:solidFill>
                   <a:srgbClr val="7030A0"/>
                 </a:solidFill>
               </a:rPr>
-              <a:t>(</a:t>
-            </a:r>
-            <a:r>
-              <a:rPr lang="en-US" sz="1200" dirty="0" err="1" smtClean="0">
+              <a:t>resetData(ReadOnly</a:t>
+            </a:r>
+          </a:p>
+          <a:p>
+            <a:r>
+              <a:rPr lang="en-US" sz="1200" dirty="0" smtClean="0">
                 <a:solidFill>
                   <a:srgbClr val="7030A0"/>
                 </a:solidFill>
               </a:rPr>
-              <a:t>ReadOnlyTopDeck</a:t>
+              <a:t>TopDeck</a:t>
             </a:r>
             <a:r>
               <a:rPr lang="en-US" sz="1200" dirty="0" smtClean="0">
@@ -5128,7 +5086,7 @@
           <p:cNvPr id="89" name="Straight Connector 88">
             <a:extLst>
               <a:ext uri="{FF2B5EF4-FFF2-40B4-BE49-F238E27FC236}">
-                <a16:creationId xmlns:a16="http://schemas.microsoft.com/office/drawing/2014/main" xmlns="" id="{E4E1C8CA-49DF-45D8-80A5-D5C8282EE927}"/>
+                <a16:creationId xmlns="" xmlns:a16="http://schemas.microsoft.com/office/drawing/2014/main" id="{E4E1C8CA-49DF-45D8-80A5-D5C8282EE927}"/>
               </a:ext>
             </a:extLst>
           </p:cNvPr>
@@ -5307,7 +5265,7 @@
           <p:cNvPr id="60" name="Straight Arrow Connector 59">
             <a:extLst>
               <a:ext uri="{FF2B5EF4-FFF2-40B4-BE49-F238E27FC236}">
-                <a16:creationId xmlns:a16="http://schemas.microsoft.com/office/drawing/2014/main" xmlns="" id="{7C9F21BC-13A9-471F-825A-2621FD36355F}"/>
+                <a16:creationId xmlns="" xmlns:a16="http://schemas.microsoft.com/office/drawing/2014/main" id="{7C9F21BC-13A9-471F-825A-2621FD36355F}"/>
               </a:ext>
             </a:extLst>
           </p:cNvPr>
@@ -5353,7 +5311,7 @@
           <p:cNvPr id="63" name="Straight Arrow Connector 62">
             <a:extLst>
               <a:ext uri="{FF2B5EF4-FFF2-40B4-BE49-F238E27FC236}">
-                <a16:creationId xmlns:a16="http://schemas.microsoft.com/office/drawing/2014/main" xmlns="" id="{7C9F21BC-13A9-471F-825A-2621FD36355F}"/>
+                <a16:creationId xmlns="" xmlns:a16="http://schemas.microsoft.com/office/drawing/2014/main" id="{7C9F21BC-13A9-471F-825A-2621FD36355F}"/>
               </a:ext>
             </a:extLst>
           </p:cNvPr>

</xml_diff>